<commit_message>
ppt revised 2 by Patrick
</commit_message>
<xml_diff>
--- a/fyp powerpoint/Fyp_revised_1.pptx
+++ b/fyp powerpoint/Fyp_revised_1.pptx
@@ -14,11 +14,13 @@
     <p:sldId id="268" r:id="rId8"/>
     <p:sldId id="267" r:id="rId9"/>
     <p:sldId id="269" r:id="rId10"/>
-    <p:sldId id="261" r:id="rId11"/>
-    <p:sldId id="262" r:id="rId12"/>
-    <p:sldId id="270" r:id="rId13"/>
-    <p:sldId id="263" r:id="rId14"/>
-    <p:sldId id="264" r:id="rId15"/>
+    <p:sldId id="271" r:id="rId11"/>
+    <p:sldId id="272" r:id="rId12"/>
+    <p:sldId id="261" r:id="rId13"/>
+    <p:sldId id="262" r:id="rId14"/>
+    <p:sldId id="270" r:id="rId15"/>
+    <p:sldId id="263" r:id="rId16"/>
+    <p:sldId id="264" r:id="rId17"/>
   </p:sldIdLst>
   <p:sldSz cx="12192000" cy="6858000"/>
   <p:notesSz cx="6858000" cy="9144000"/>
@@ -3562,6 +3564,436 @@
           <p:cNvPr id="2" name="Title 1">
             <a:extLst>
               <a:ext uri="{FF2B5EF4-FFF2-40B4-BE49-F238E27FC236}">
+                <a16:creationId xmlns:a16="http://schemas.microsoft.com/office/drawing/2014/main" id="{DBC9710D-9CB1-47F1-8773-8C3143010D2C}"/>
+              </a:ext>
+            </a:extLst>
+          </p:cNvPr>
+          <p:cNvSpPr>
+            <a:spLocks noGrp="1"/>
+          </p:cNvSpPr>
+          <p:nvPr>
+            <p:ph type="title"/>
+          </p:nvPr>
+        </p:nvSpPr>
+        <p:spPr/>
+        <p:txBody>
+          <a:bodyPr/>
+          <a:lstStyle/>
+          <a:p>
+            <a:pPr algn="ctr"/>
+            <a:r>
+              <a:rPr lang="en-US" b="0" i="0" u="sng" dirty="0">
+                <a:solidFill>
+                  <a:srgbClr val="333333"/>
+                </a:solidFill>
+                <a:effectLst/>
+                <a:latin typeface="Montserrat"/>
+              </a:rPr>
+              <a:t>Natural Language Processing</a:t>
+            </a:r>
+            <a:endParaRPr lang="en-US" u="sng" dirty="0"/>
+          </a:p>
+        </p:txBody>
+      </p:sp>
+      <p:sp>
+        <p:nvSpPr>
+          <p:cNvPr id="5" name="文字方塊 4">
+            <a:extLst>
+              <a:ext uri="{FF2B5EF4-FFF2-40B4-BE49-F238E27FC236}">
+                <a16:creationId xmlns:a16="http://schemas.microsoft.com/office/drawing/2014/main" id="{6419318E-E927-4883-A574-13E318FB3893}"/>
+              </a:ext>
+            </a:extLst>
+          </p:cNvPr>
+          <p:cNvSpPr txBox="1"/>
+          <p:nvPr/>
+        </p:nvSpPr>
+        <p:spPr>
+          <a:xfrm>
+            <a:off x="1236089" y="3013501"/>
+            <a:ext cx="9719822" cy="830997"/>
+          </a:xfrm>
+          <a:prstGeom prst="rect">
+            <a:avLst/>
+          </a:prstGeom>
+          <a:noFill/>
+        </p:spPr>
+        <p:txBody>
+          <a:bodyPr wrap="square" rtlCol="0">
+            <a:spAutoFit/>
+          </a:bodyPr>
+          <a:lstStyle/>
+          <a:p>
+            <a:r>
+              <a:rPr lang="en-US" altLang="zh-TW" sz="4800" dirty="0">
+                <a:solidFill>
+                  <a:srgbClr val="00B0F0"/>
+                </a:solidFill>
+              </a:rPr>
+              <a:t>&lt;</a:t>
+            </a:r>
+            <a:r>
+              <a:rPr lang="en-US" altLang="zh-TW" sz="4800" dirty="0" err="1">
+                <a:solidFill>
+                  <a:srgbClr val="00B0F0"/>
+                </a:solidFill>
+              </a:rPr>
+              <a:t>Q_opening_struct</a:t>
+            </a:r>
+            <a:r>
+              <a:rPr lang="en-US" altLang="zh-TW" sz="4800" dirty="0">
+                <a:solidFill>
+                  <a:srgbClr val="00B0F0"/>
+                </a:solidFill>
+              </a:rPr>
+              <a:t>&gt;</a:t>
+            </a:r>
+            <a:r>
+              <a:rPr lang="en-US" altLang="zh-TW" sz="4800" dirty="0">
+                <a:solidFill>
+                  <a:srgbClr val="00B050"/>
+                </a:solidFill>
+              </a:rPr>
+              <a:t>&lt;Content&gt;</a:t>
+            </a:r>
+            <a:r>
+              <a:rPr lang="en-US" altLang="zh-TW" sz="4800" dirty="0">
+                <a:solidFill>
+                  <a:srgbClr val="FF0000"/>
+                </a:solidFill>
+              </a:rPr>
+              <a:t>&lt;Time&gt;</a:t>
+            </a:r>
+            <a:endParaRPr lang="zh-TW" altLang="en-US" sz="4800" dirty="0"/>
+          </a:p>
+        </p:txBody>
+      </p:sp>
+      <p:cxnSp>
+        <p:nvCxnSpPr>
+          <p:cNvPr id="8" name="直線接點 7">
+            <a:extLst>
+              <a:ext uri="{FF2B5EF4-FFF2-40B4-BE49-F238E27FC236}">
+                <a16:creationId xmlns:a16="http://schemas.microsoft.com/office/drawing/2014/main" id="{8C03C8E2-E0B1-4530-90AA-91A8BEB26E08}"/>
+              </a:ext>
+            </a:extLst>
+          </p:cNvPr>
+          <p:cNvCxnSpPr>
+            <a:cxnSpLocks/>
+          </p:cNvCxnSpPr>
+          <p:nvPr/>
+        </p:nvCxnSpPr>
+        <p:spPr>
+          <a:xfrm rot="5400000">
+            <a:off x="5723431" y="4459022"/>
+            <a:ext cx="720000" cy="0"/>
+          </a:xfrm>
+          <a:prstGeom prst="line">
+            <a:avLst/>
+          </a:prstGeom>
+          <a:ln w="63500">
+            <a:solidFill>
+              <a:schemeClr val="tx1"/>
+            </a:solidFill>
+            <a:prstDash val="sysDot"/>
+          </a:ln>
+        </p:spPr>
+        <p:style>
+          <a:lnRef idx="1">
+            <a:schemeClr val="accent1"/>
+          </a:lnRef>
+          <a:fillRef idx="0">
+            <a:schemeClr val="accent1"/>
+          </a:fillRef>
+          <a:effectRef idx="0">
+            <a:schemeClr val="accent1"/>
+          </a:effectRef>
+          <a:fontRef idx="minor">
+            <a:schemeClr val="tx1"/>
+          </a:fontRef>
+        </p:style>
+      </p:cxnSp>
+      <p:cxnSp>
+        <p:nvCxnSpPr>
+          <p:cNvPr id="14" name="直線接點 13">
+            <a:extLst>
+              <a:ext uri="{FF2B5EF4-FFF2-40B4-BE49-F238E27FC236}">
+                <a16:creationId xmlns:a16="http://schemas.microsoft.com/office/drawing/2014/main" id="{26305CA2-5443-4023-B385-22AE27B99CDF}"/>
+              </a:ext>
+            </a:extLst>
+          </p:cNvPr>
+          <p:cNvCxnSpPr>
+            <a:cxnSpLocks/>
+          </p:cNvCxnSpPr>
+          <p:nvPr/>
+        </p:nvCxnSpPr>
+        <p:spPr>
+          <a:xfrm rot="5400000">
+            <a:off x="5723431" y="2603512"/>
+            <a:ext cx="720000" cy="0"/>
+          </a:xfrm>
+          <a:prstGeom prst="line">
+            <a:avLst/>
+          </a:prstGeom>
+          <a:ln w="63500">
+            <a:solidFill>
+              <a:schemeClr val="tx1"/>
+            </a:solidFill>
+            <a:prstDash val="sysDot"/>
+          </a:ln>
+        </p:spPr>
+        <p:style>
+          <a:lnRef idx="1">
+            <a:schemeClr val="accent1"/>
+          </a:lnRef>
+          <a:fillRef idx="0">
+            <a:schemeClr val="accent1"/>
+          </a:fillRef>
+          <a:effectRef idx="0">
+            <a:schemeClr val="accent1"/>
+          </a:effectRef>
+          <a:fontRef idx="minor">
+            <a:schemeClr val="tx1"/>
+          </a:fontRef>
+        </p:style>
+      </p:cxnSp>
+      <p:sp>
+        <p:nvSpPr>
+          <p:cNvPr id="10" name="文字方塊 9">
+            <a:extLst>
+              <a:ext uri="{FF2B5EF4-FFF2-40B4-BE49-F238E27FC236}">
+                <a16:creationId xmlns:a16="http://schemas.microsoft.com/office/drawing/2014/main" id="{EF45CA5C-3BEC-4C18-8A45-DC1DF97F4429}"/>
+              </a:ext>
+            </a:extLst>
+          </p:cNvPr>
+          <p:cNvSpPr txBox="1"/>
+          <p:nvPr/>
+        </p:nvSpPr>
+        <p:spPr>
+          <a:xfrm>
+            <a:off x="3749510" y="5846544"/>
+            <a:ext cx="7604290" cy="646331"/>
+          </a:xfrm>
+          <a:prstGeom prst="rect">
+            <a:avLst/>
+          </a:prstGeom>
+          <a:noFill/>
+        </p:spPr>
+        <p:txBody>
+          <a:bodyPr wrap="square" rtlCol="0">
+            <a:spAutoFit/>
+          </a:bodyPr>
+          <a:lstStyle/>
+          <a:p>
+            <a:r>
+              <a:rPr lang="en-US" altLang="zh-TW" sz="3600" dirty="0"/>
+              <a:t>It can be hundreds or even thousands!!</a:t>
+            </a:r>
+            <a:endParaRPr lang="zh-TW" altLang="en-US" sz="3600" dirty="0"/>
+          </a:p>
+        </p:txBody>
+      </p:sp>
+    </p:spTree>
+    <p:extLst>
+      <p:ext uri="{BB962C8B-B14F-4D97-AF65-F5344CB8AC3E}">
+        <p14:creationId xmlns:p14="http://schemas.microsoft.com/office/powerpoint/2010/main" val="1149932002"/>
+      </p:ext>
+    </p:extLst>
+  </p:cSld>
+  <p:clrMapOvr>
+    <a:masterClrMapping/>
+  </p:clrMapOvr>
+</p:sld>
+</file>
+
+<file path=ppt/slides/slide11.xml><?xml version="1.0" encoding="utf-8"?>
+<p:sld xmlns:a="http://schemas.openxmlformats.org/drawingml/2006/main" xmlns:r="http://schemas.openxmlformats.org/officeDocument/2006/relationships" xmlns:p="http://schemas.openxmlformats.org/presentationml/2006/main">
+  <p:cSld>
+    <p:bg>
+      <p:bgPr>
+        <a:blipFill dpi="0" rotWithShape="1">
+          <a:blip r:embed="rId2">
+            <a:lum/>
+          </a:blip>
+          <a:srcRect/>
+          <a:stretch>
+            <a:fillRect t="-17000" b="-17000"/>
+          </a:stretch>
+        </a:blipFill>
+        <a:effectLst/>
+      </p:bgPr>
+    </p:bg>
+    <p:spTree>
+      <p:nvGrpSpPr>
+        <p:cNvPr id="1" name=""/>
+        <p:cNvGrpSpPr/>
+        <p:nvPr/>
+      </p:nvGrpSpPr>
+      <p:grpSpPr>
+        <a:xfrm>
+          <a:off x="0" y="0"/>
+          <a:ext cx="0" cy="0"/>
+          <a:chOff x="0" y="0"/>
+          <a:chExt cx="0" cy="0"/>
+        </a:xfrm>
+      </p:grpSpPr>
+      <p:sp>
+        <p:nvSpPr>
+          <p:cNvPr id="2" name="Title 1">
+            <a:extLst>
+              <a:ext uri="{FF2B5EF4-FFF2-40B4-BE49-F238E27FC236}">
+                <a16:creationId xmlns:a16="http://schemas.microsoft.com/office/drawing/2014/main" id="{DBC9710D-9CB1-47F1-8773-8C3143010D2C}"/>
+              </a:ext>
+            </a:extLst>
+          </p:cNvPr>
+          <p:cNvSpPr>
+            <a:spLocks noGrp="1"/>
+          </p:cNvSpPr>
+          <p:nvPr>
+            <p:ph type="title"/>
+          </p:nvPr>
+        </p:nvSpPr>
+        <p:spPr/>
+        <p:txBody>
+          <a:bodyPr/>
+          <a:lstStyle/>
+          <a:p>
+            <a:pPr algn="ctr"/>
+            <a:r>
+              <a:rPr lang="en-US" b="0" i="0" u="sng" dirty="0">
+                <a:solidFill>
+                  <a:srgbClr val="333333"/>
+                </a:solidFill>
+                <a:effectLst/>
+                <a:latin typeface="Montserrat"/>
+              </a:rPr>
+              <a:t>Natural Language Processing (Cont’d)</a:t>
+            </a:r>
+            <a:endParaRPr lang="en-US" u="sng" dirty="0"/>
+          </a:p>
+        </p:txBody>
+      </p:sp>
+      <p:sp>
+        <p:nvSpPr>
+          <p:cNvPr id="3" name="內容版面配置區 2">
+            <a:extLst>
+              <a:ext uri="{FF2B5EF4-FFF2-40B4-BE49-F238E27FC236}">
+                <a16:creationId xmlns:a16="http://schemas.microsoft.com/office/drawing/2014/main" id="{247B1C63-2220-41E4-BB40-50550DFEAD1E}"/>
+              </a:ext>
+            </a:extLst>
+          </p:cNvPr>
+          <p:cNvSpPr>
+            <a:spLocks noGrp="1"/>
+          </p:cNvSpPr>
+          <p:nvPr>
+            <p:ph idx="1"/>
+          </p:nvPr>
+        </p:nvSpPr>
+        <p:spPr/>
+        <p:txBody>
+          <a:bodyPr/>
+          <a:lstStyle/>
+          <a:p>
+            <a:r>
+              <a:rPr lang="en-US" altLang="zh-TW" dirty="0"/>
+              <a:t>Categorize the message</a:t>
+            </a:r>
+          </a:p>
+          <a:p>
+            <a:pPr lvl="1"/>
+            <a:r>
+              <a:rPr lang="en-US" altLang="zh-TW" dirty="0"/>
+              <a:t>identify the words in the sentence</a:t>
+            </a:r>
+          </a:p>
+          <a:p>
+            <a:pPr lvl="1"/>
+            <a:r>
+              <a:rPr lang="en-US" altLang="zh-TW" dirty="0"/>
+              <a:t>regroup into different sentence structure</a:t>
+            </a:r>
+          </a:p>
+          <a:p>
+            <a:pPr lvl="1"/>
+            <a:r>
+              <a:rPr lang="en-US" altLang="zh-TW" dirty="0"/>
+              <a:t>categorize the sentence structure</a:t>
+            </a:r>
+          </a:p>
+          <a:p>
+            <a:pPr lvl="1"/>
+            <a:endParaRPr lang="en-US" altLang="zh-TW" dirty="0"/>
+          </a:p>
+          <a:p>
+            <a:r>
+              <a:rPr lang="en-US" altLang="zh-TW" dirty="0"/>
+              <a:t>When sufficient conditions meet</a:t>
+            </a:r>
+          </a:p>
+          <a:p>
+            <a:pPr lvl="1"/>
+            <a:r>
+              <a:rPr lang="en-US" altLang="zh-TW" dirty="0"/>
+              <a:t>provide appropriate information </a:t>
+            </a:r>
+          </a:p>
+          <a:p>
+            <a:pPr lvl="1"/>
+            <a:r>
+              <a:rPr lang="en-US" altLang="zh-TW" dirty="0"/>
+              <a:t>ask for extra information to provide more concrete answer</a:t>
+            </a:r>
+            <a:endParaRPr lang="zh-TW" altLang="en-US" dirty="0"/>
+          </a:p>
+        </p:txBody>
+      </p:sp>
+    </p:spTree>
+    <p:extLst>
+      <p:ext uri="{BB962C8B-B14F-4D97-AF65-F5344CB8AC3E}">
+        <p14:creationId xmlns:p14="http://schemas.microsoft.com/office/powerpoint/2010/main" val="3892248395"/>
+      </p:ext>
+    </p:extLst>
+  </p:cSld>
+  <p:clrMapOvr>
+    <a:masterClrMapping/>
+  </p:clrMapOvr>
+</p:sld>
+</file>
+
+<file path=ppt/slides/slide12.xml><?xml version="1.0" encoding="utf-8"?>
+<p:sld xmlns:a="http://schemas.openxmlformats.org/drawingml/2006/main" xmlns:r="http://schemas.openxmlformats.org/officeDocument/2006/relationships" xmlns:p="http://schemas.openxmlformats.org/presentationml/2006/main">
+  <p:cSld>
+    <p:bg>
+      <p:bgPr>
+        <a:blipFill dpi="0" rotWithShape="1">
+          <a:blip r:embed="rId2">
+            <a:lum/>
+          </a:blip>
+          <a:srcRect/>
+          <a:stretch>
+            <a:fillRect t="-17000" b="-17000"/>
+          </a:stretch>
+        </a:blipFill>
+        <a:effectLst/>
+      </p:bgPr>
+    </p:bg>
+    <p:spTree>
+      <p:nvGrpSpPr>
+        <p:cNvPr id="1" name=""/>
+        <p:cNvGrpSpPr/>
+        <p:nvPr/>
+      </p:nvGrpSpPr>
+      <p:grpSpPr>
+        <a:xfrm>
+          <a:off x="0" y="0"/>
+          <a:ext cx="0" cy="0"/>
+          <a:chOff x="0" y="0"/>
+          <a:chExt cx="0" cy="0"/>
+        </a:xfrm>
+      </p:grpSpPr>
+      <p:sp>
+        <p:nvSpPr>
+          <p:cNvPr id="2" name="Title 1">
+            <a:extLst>
+              <a:ext uri="{FF2B5EF4-FFF2-40B4-BE49-F238E27FC236}">
                 <a16:creationId xmlns:a16="http://schemas.microsoft.com/office/drawing/2014/main" id="{4D3F918D-037C-4E66-9F08-DF2A92E9CC79}"/>
               </a:ext>
             </a:extLst>
@@ -3669,7 +4101,7 @@
 </p:sld>
 </file>
 
-<file path=ppt/slides/slide11.xml><?xml version="1.0" encoding="utf-8"?>
+<file path=ppt/slides/slide13.xml><?xml version="1.0" encoding="utf-8"?>
 <p:sld xmlns:a="http://schemas.openxmlformats.org/drawingml/2006/main" xmlns:r="http://schemas.openxmlformats.org/officeDocument/2006/relationships" xmlns:p="http://schemas.openxmlformats.org/presentationml/2006/main">
   <p:cSld>
     <p:bg>
@@ -5310,7 +5742,7 @@
 </p:sld>
 </file>
 
-<file path=ppt/slides/slide12.xml><?xml version="1.0" encoding="utf-8"?>
+<file path=ppt/slides/slide14.xml><?xml version="1.0" encoding="utf-8"?>
 <p:sld xmlns:a="http://schemas.openxmlformats.org/drawingml/2006/main" xmlns:r="http://schemas.openxmlformats.org/officeDocument/2006/relationships" xmlns:p="http://schemas.openxmlformats.org/presentationml/2006/main">
   <p:cSld>
     <p:bg>
@@ -6491,7 +6923,7 @@
 </p:sld>
 </file>
 
-<file path=ppt/slides/slide13.xml><?xml version="1.0" encoding="utf-8"?>
+<file path=ppt/slides/slide15.xml><?xml version="1.0" encoding="utf-8"?>
 <p:sld xmlns:a="http://schemas.openxmlformats.org/drawingml/2006/main" xmlns:r="http://schemas.openxmlformats.org/officeDocument/2006/relationships" xmlns:p="http://schemas.openxmlformats.org/presentationml/2006/main">
   <p:cSld>
     <p:bg>
@@ -6592,7 +7024,7 @@
 </p:sld>
 </file>
 
-<file path=ppt/slides/slide14.xml><?xml version="1.0" encoding="utf-8"?>
+<file path=ppt/slides/slide16.xml><?xml version="1.0" encoding="utf-8"?>
 <p:sld xmlns:a="http://schemas.openxmlformats.org/drawingml/2006/main" xmlns:r="http://schemas.openxmlformats.org/officeDocument/2006/relationships" xmlns:p="http://schemas.openxmlformats.org/presentationml/2006/main">
   <p:cSld>
     <p:bg>
@@ -7689,12 +8121,56 @@
             <p:ph idx="1"/>
           </p:nvPr>
         </p:nvSpPr>
-        <p:spPr/>
+        <p:spPr>
+          <a:xfrm>
+            <a:off x="838200" y="1825625"/>
+            <a:ext cx="10515600" cy="537867"/>
+          </a:xfrm>
+        </p:spPr>
         <p:txBody>
           <a:bodyPr/>
           <a:lstStyle/>
           <a:p>
-            <a:endParaRPr lang="en-US" dirty="0"/>
+            <a:r>
+              <a:rPr lang="en-US" dirty="0"/>
+              <a:t>How the computer understand the sentences we write/talk in natural</a:t>
+            </a:r>
+          </a:p>
+        </p:txBody>
+      </p:sp>
+      <p:sp>
+        <p:nvSpPr>
+          <p:cNvPr id="4" name="文字方塊 3">
+            <a:extLst>
+              <a:ext uri="{FF2B5EF4-FFF2-40B4-BE49-F238E27FC236}">
+                <a16:creationId xmlns:a16="http://schemas.microsoft.com/office/drawing/2014/main" id="{1F5B76D8-4B17-4231-8E71-1EC52A289792}"/>
+              </a:ext>
+            </a:extLst>
+          </p:cNvPr>
+          <p:cNvSpPr txBox="1"/>
+          <p:nvPr/>
+        </p:nvSpPr>
+        <p:spPr>
+          <a:xfrm>
+            <a:off x="2543659" y="3013502"/>
+            <a:ext cx="7104682" cy="830997"/>
+          </a:xfrm>
+          <a:prstGeom prst="rect">
+            <a:avLst/>
+          </a:prstGeom>
+          <a:noFill/>
+        </p:spPr>
+        <p:txBody>
+          <a:bodyPr wrap="square" rtlCol="0">
+            <a:spAutoFit/>
+          </a:bodyPr>
+          <a:lstStyle/>
+          <a:p>
+            <a:r>
+              <a:rPr lang="en-US" altLang="zh-TW" sz="4800" dirty="0"/>
+              <a:t>What is the weather today?</a:t>
+            </a:r>
+            <a:endParaRPr lang="zh-TW" altLang="en-US" sz="4800" dirty="0"/>
           </a:p>
         </p:txBody>
       </p:sp>
@@ -7780,26 +8256,514 @@
       </p:sp>
       <p:sp>
         <p:nvSpPr>
-          <p:cNvPr id="3" name="Content Placeholder 2">
-            <a:extLst>
-              <a:ext uri="{FF2B5EF4-FFF2-40B4-BE49-F238E27FC236}">
-                <a16:creationId xmlns:a16="http://schemas.microsoft.com/office/drawing/2014/main" id="{110D9110-1DC0-4ACB-8307-58A9D19A0494}"/>
-              </a:ext>
-            </a:extLst>
-          </p:cNvPr>
-          <p:cNvSpPr>
-            <a:spLocks noGrp="1"/>
-          </p:cNvSpPr>
-          <p:nvPr>
-            <p:ph idx="1"/>
-          </p:nvPr>
-        </p:nvSpPr>
-        <p:spPr/>
-        <p:txBody>
-          <a:bodyPr/>
+          <p:cNvPr id="5" name="文字方塊 4">
+            <a:extLst>
+              <a:ext uri="{FF2B5EF4-FFF2-40B4-BE49-F238E27FC236}">
+                <a16:creationId xmlns:a16="http://schemas.microsoft.com/office/drawing/2014/main" id="{6419318E-E927-4883-A574-13E318FB3893}"/>
+              </a:ext>
+            </a:extLst>
+          </p:cNvPr>
+          <p:cNvSpPr txBox="1"/>
+          <p:nvPr/>
+        </p:nvSpPr>
+        <p:spPr>
+          <a:xfrm>
+            <a:off x="2543659" y="3013502"/>
+            <a:ext cx="7104682" cy="830997"/>
+          </a:xfrm>
+          <a:prstGeom prst="rect">
+            <a:avLst/>
+          </a:prstGeom>
+          <a:noFill/>
+        </p:spPr>
+        <p:txBody>
+          <a:bodyPr wrap="square" rtlCol="0">
+            <a:spAutoFit/>
+          </a:bodyPr>
           <a:lstStyle/>
           <a:p>
-            <a:endParaRPr lang="en-US" dirty="0"/>
+            <a:r>
+              <a:rPr lang="en-US" altLang="zh-TW" sz="4800" dirty="0">
+                <a:solidFill>
+                  <a:srgbClr val="00B0F0"/>
+                </a:solidFill>
+              </a:rPr>
+              <a:t>What is </a:t>
+            </a:r>
+            <a:r>
+              <a:rPr lang="en-US" altLang="zh-TW" sz="4800" dirty="0">
+                <a:solidFill>
+                  <a:srgbClr val="00B050"/>
+                </a:solidFill>
+              </a:rPr>
+              <a:t>the weather </a:t>
+            </a:r>
+            <a:r>
+              <a:rPr lang="en-US" altLang="zh-TW" sz="4800" dirty="0">
+                <a:solidFill>
+                  <a:srgbClr val="FF0000"/>
+                </a:solidFill>
+              </a:rPr>
+              <a:t>today</a:t>
+            </a:r>
+            <a:r>
+              <a:rPr lang="en-US" altLang="zh-TW" sz="4800" dirty="0"/>
+              <a:t>?</a:t>
+            </a:r>
+            <a:endParaRPr lang="zh-TW" altLang="en-US" sz="4800" dirty="0"/>
+          </a:p>
+        </p:txBody>
+      </p:sp>
+      <p:sp>
+        <p:nvSpPr>
+          <p:cNvPr id="6" name="圖說文字: 直線 5">
+            <a:extLst>
+              <a:ext uri="{FF2B5EF4-FFF2-40B4-BE49-F238E27FC236}">
+                <a16:creationId xmlns:a16="http://schemas.microsoft.com/office/drawing/2014/main" id="{04CC0389-047C-458B-B3D6-25C131FA6018}"/>
+              </a:ext>
+            </a:extLst>
+          </p:cNvPr>
+          <p:cNvSpPr/>
+          <p:nvPr/>
+        </p:nvSpPr>
+        <p:spPr>
+          <a:xfrm>
+            <a:off x="838200" y="4700514"/>
+            <a:ext cx="3290740" cy="485429"/>
+          </a:xfrm>
+          <a:prstGeom prst="borderCallout1">
+            <a:avLst>
+              <a:gd name="adj1" fmla="val -24273"/>
+              <a:gd name="adj2" fmla="val 67816"/>
+              <a:gd name="adj3" fmla="val -150524"/>
+              <a:gd name="adj4" fmla="val 79553"/>
+            </a:avLst>
+          </a:prstGeom>
+          <a:noFill/>
+          <a:ln w="38100">
+            <a:solidFill>
+              <a:srgbClr val="00B0F0"/>
+            </a:solidFill>
+            <a:prstDash val="solid"/>
+            <a:headEnd w="lg" len="lg"/>
+            <a:tailEnd type="stealth"/>
+          </a:ln>
+        </p:spPr>
+        <p:style>
+          <a:lnRef idx="2">
+            <a:schemeClr val="accent1">
+              <a:shade val="50000"/>
+            </a:schemeClr>
+          </a:lnRef>
+          <a:fillRef idx="1">
+            <a:schemeClr val="accent1"/>
+          </a:fillRef>
+          <a:effectRef idx="0">
+            <a:schemeClr val="accent1"/>
+          </a:effectRef>
+          <a:fontRef idx="minor">
+            <a:schemeClr val="lt1"/>
+          </a:fontRef>
+        </p:style>
+        <p:txBody>
+          <a:bodyPr rtlCol="0" anchor="ctr"/>
+          <a:lstStyle/>
+          <a:p>
+            <a:pPr algn="ctr"/>
+            <a:r>
+              <a:rPr lang="en-US" altLang="zh-TW" sz="2400" dirty="0" err="1">
+                <a:solidFill>
+                  <a:srgbClr val="00B0F0"/>
+                </a:solidFill>
+              </a:rPr>
+              <a:t>Recognise</a:t>
+            </a:r>
+            <a:r>
+              <a:rPr lang="en-US" altLang="zh-TW" sz="2400" dirty="0">
+                <a:solidFill>
+                  <a:srgbClr val="00B0F0"/>
+                </a:solidFill>
+              </a:rPr>
+              <a:t> it is a question</a:t>
+            </a:r>
+            <a:endParaRPr lang="zh-TW" altLang="en-US" sz="2400" dirty="0">
+              <a:solidFill>
+                <a:srgbClr val="00B0F0"/>
+              </a:solidFill>
+            </a:endParaRPr>
+          </a:p>
+        </p:txBody>
+      </p:sp>
+      <p:sp>
+        <p:nvSpPr>
+          <p:cNvPr id="7" name="矩形 6">
+            <a:extLst>
+              <a:ext uri="{FF2B5EF4-FFF2-40B4-BE49-F238E27FC236}">
+                <a16:creationId xmlns:a16="http://schemas.microsoft.com/office/drawing/2014/main" id="{5BFA327F-77D9-4B17-BA60-DF9680CD0ADB}"/>
+              </a:ext>
+            </a:extLst>
+          </p:cNvPr>
+          <p:cNvSpPr/>
+          <p:nvPr/>
+        </p:nvSpPr>
+        <p:spPr>
+          <a:xfrm>
+            <a:off x="2543659" y="3052707"/>
+            <a:ext cx="2005094" cy="752586"/>
+          </a:xfrm>
+          <a:prstGeom prst="rect">
+            <a:avLst/>
+          </a:prstGeom>
+          <a:noFill/>
+          <a:ln w="38100">
+            <a:solidFill>
+              <a:srgbClr val="00B0F0"/>
+            </a:solidFill>
+            <a:prstDash val="dash"/>
+          </a:ln>
+        </p:spPr>
+        <p:style>
+          <a:lnRef idx="2">
+            <a:schemeClr val="accent1">
+              <a:shade val="50000"/>
+            </a:schemeClr>
+          </a:lnRef>
+          <a:fillRef idx="1">
+            <a:schemeClr val="accent1"/>
+          </a:fillRef>
+          <a:effectRef idx="0">
+            <a:schemeClr val="accent1"/>
+          </a:effectRef>
+          <a:fontRef idx="minor">
+            <a:schemeClr val="lt1"/>
+          </a:fontRef>
+        </p:style>
+        <p:txBody>
+          <a:bodyPr rtlCol="0" anchor="ctr"/>
+          <a:lstStyle/>
+          <a:p>
+            <a:pPr algn="ctr"/>
+            <a:endParaRPr lang="zh-TW" altLang="en-US"/>
+          </a:p>
+        </p:txBody>
+      </p:sp>
+      <p:sp>
+        <p:nvSpPr>
+          <p:cNvPr id="9" name="圖說文字: 直線 8">
+            <a:extLst>
+              <a:ext uri="{FF2B5EF4-FFF2-40B4-BE49-F238E27FC236}">
+                <a16:creationId xmlns:a16="http://schemas.microsoft.com/office/drawing/2014/main" id="{23E5166A-99A8-4F48-8129-C47F0282A0C6}"/>
+              </a:ext>
+            </a:extLst>
+          </p:cNvPr>
+          <p:cNvSpPr/>
+          <p:nvPr/>
+        </p:nvSpPr>
+        <p:spPr>
+          <a:xfrm>
+            <a:off x="4279678" y="1880338"/>
+            <a:ext cx="3632644" cy="468000"/>
+          </a:xfrm>
+          <a:prstGeom prst="borderCallout1">
+            <a:avLst>
+              <a:gd name="adj1" fmla="val 145725"/>
+              <a:gd name="adj2" fmla="val 49764"/>
+              <a:gd name="adj3" fmla="val 226284"/>
+              <a:gd name="adj4" fmla="val 49828"/>
+            </a:avLst>
+          </a:prstGeom>
+          <a:noFill/>
+          <a:ln w="38100" cmpd="sng">
+            <a:solidFill>
+              <a:srgbClr val="00B050"/>
+            </a:solidFill>
+            <a:prstDash val="solid"/>
+            <a:tailEnd type="stealth"/>
+          </a:ln>
+        </p:spPr>
+        <p:style>
+          <a:lnRef idx="2">
+            <a:schemeClr val="accent1">
+              <a:shade val="50000"/>
+            </a:schemeClr>
+          </a:lnRef>
+          <a:fillRef idx="1">
+            <a:schemeClr val="accent1"/>
+          </a:fillRef>
+          <a:effectRef idx="0">
+            <a:schemeClr val="accent1"/>
+          </a:effectRef>
+          <a:fontRef idx="minor">
+            <a:schemeClr val="lt1"/>
+          </a:fontRef>
+        </p:style>
+        <p:txBody>
+          <a:bodyPr rtlCol="0" anchor="ctr"/>
+          <a:lstStyle/>
+          <a:p>
+            <a:pPr algn="ctr"/>
+            <a:r>
+              <a:rPr lang="en-US" altLang="zh-TW" sz="2400" dirty="0">
+                <a:solidFill>
+                  <a:srgbClr val="00B050"/>
+                </a:solidFill>
+              </a:rPr>
+              <a:t>The information asking for</a:t>
+            </a:r>
+            <a:endParaRPr lang="zh-TW" altLang="en-US" sz="2400" dirty="0">
+              <a:solidFill>
+                <a:srgbClr val="00B050"/>
+              </a:solidFill>
+            </a:endParaRPr>
+          </a:p>
+        </p:txBody>
+      </p:sp>
+      <p:sp>
+        <p:nvSpPr>
+          <p:cNvPr id="11" name="矩形 10">
+            <a:extLst>
+              <a:ext uri="{FF2B5EF4-FFF2-40B4-BE49-F238E27FC236}">
+                <a16:creationId xmlns:a16="http://schemas.microsoft.com/office/drawing/2014/main" id="{3F4B3550-E4AD-407D-A757-6742D414F611}"/>
+              </a:ext>
+            </a:extLst>
+          </p:cNvPr>
+          <p:cNvSpPr/>
+          <p:nvPr/>
+        </p:nvSpPr>
+        <p:spPr>
+          <a:xfrm>
+            <a:off x="4617847" y="3052707"/>
+            <a:ext cx="3108058" cy="752586"/>
+          </a:xfrm>
+          <a:prstGeom prst="rect">
+            <a:avLst/>
+          </a:prstGeom>
+          <a:noFill/>
+          <a:ln w="38100">
+            <a:solidFill>
+              <a:srgbClr val="00B050"/>
+            </a:solidFill>
+            <a:prstDash val="dash"/>
+          </a:ln>
+        </p:spPr>
+        <p:style>
+          <a:lnRef idx="2">
+            <a:schemeClr val="accent1">
+              <a:shade val="50000"/>
+            </a:schemeClr>
+          </a:lnRef>
+          <a:fillRef idx="1">
+            <a:schemeClr val="accent1"/>
+          </a:fillRef>
+          <a:effectRef idx="0">
+            <a:schemeClr val="accent1"/>
+          </a:effectRef>
+          <a:fontRef idx="minor">
+            <a:schemeClr val="lt1"/>
+          </a:fontRef>
+        </p:style>
+        <p:txBody>
+          <a:bodyPr rtlCol="0" anchor="ctr"/>
+          <a:lstStyle/>
+          <a:p>
+            <a:pPr algn="ctr"/>
+            <a:endParaRPr lang="zh-TW" altLang="en-US"/>
+          </a:p>
+        </p:txBody>
+      </p:sp>
+      <p:sp>
+        <p:nvSpPr>
+          <p:cNvPr id="13" name="矩形 12">
+            <a:extLst>
+              <a:ext uri="{FF2B5EF4-FFF2-40B4-BE49-F238E27FC236}">
+                <a16:creationId xmlns:a16="http://schemas.microsoft.com/office/drawing/2014/main" id="{F017D2ED-3FD5-40B0-A6BF-7F9BE1953AA0}"/>
+              </a:ext>
+            </a:extLst>
+          </p:cNvPr>
+          <p:cNvSpPr/>
+          <p:nvPr/>
+        </p:nvSpPr>
+        <p:spPr>
+          <a:xfrm>
+            <a:off x="7794999" y="3052707"/>
+            <a:ext cx="1424415" cy="752586"/>
+          </a:xfrm>
+          <a:prstGeom prst="rect">
+            <a:avLst/>
+          </a:prstGeom>
+          <a:noFill/>
+          <a:ln w="38100">
+            <a:solidFill>
+              <a:srgbClr val="FF0000"/>
+            </a:solidFill>
+            <a:prstDash val="dash"/>
+          </a:ln>
+        </p:spPr>
+        <p:style>
+          <a:lnRef idx="2">
+            <a:schemeClr val="accent1">
+              <a:shade val="50000"/>
+            </a:schemeClr>
+          </a:lnRef>
+          <a:fillRef idx="1">
+            <a:schemeClr val="accent1"/>
+          </a:fillRef>
+          <a:effectRef idx="0">
+            <a:schemeClr val="accent1"/>
+          </a:effectRef>
+          <a:fontRef idx="minor">
+            <a:schemeClr val="lt1"/>
+          </a:fontRef>
+        </p:style>
+        <p:txBody>
+          <a:bodyPr rtlCol="0" anchor="ctr"/>
+          <a:lstStyle/>
+          <a:p>
+            <a:pPr algn="ctr"/>
+            <a:endParaRPr lang="zh-TW" altLang="en-US"/>
+          </a:p>
+        </p:txBody>
+      </p:sp>
+      <p:sp>
+        <p:nvSpPr>
+          <p:cNvPr id="15" name="圖說文字: 直線 14">
+            <a:extLst>
+              <a:ext uri="{FF2B5EF4-FFF2-40B4-BE49-F238E27FC236}">
+                <a16:creationId xmlns:a16="http://schemas.microsoft.com/office/drawing/2014/main" id="{5BB638C5-AEBD-4BD9-83C8-36DD01D7E83D}"/>
+              </a:ext>
+            </a:extLst>
+          </p:cNvPr>
+          <p:cNvSpPr/>
+          <p:nvPr/>
+        </p:nvSpPr>
+        <p:spPr>
+          <a:xfrm>
+            <a:off x="8159593" y="4700514"/>
+            <a:ext cx="3194207" cy="485429"/>
+          </a:xfrm>
+          <a:prstGeom prst="borderCallout1">
+            <a:avLst>
+              <a:gd name="adj1" fmla="val -31087"/>
+              <a:gd name="adj2" fmla="val 32149"/>
+              <a:gd name="adj3" fmla="val -145556"/>
+              <a:gd name="adj4" fmla="val 16547"/>
+            </a:avLst>
+          </a:prstGeom>
+          <a:noFill/>
+          <a:ln w="38100" cmpd="sng">
+            <a:solidFill>
+              <a:srgbClr val="FF0000"/>
+            </a:solidFill>
+            <a:prstDash val="solid"/>
+            <a:tailEnd type="stealth"/>
+          </a:ln>
+        </p:spPr>
+        <p:style>
+          <a:lnRef idx="2">
+            <a:schemeClr val="accent1">
+              <a:shade val="50000"/>
+            </a:schemeClr>
+          </a:lnRef>
+          <a:fillRef idx="1">
+            <a:schemeClr val="accent1"/>
+          </a:fillRef>
+          <a:effectRef idx="0">
+            <a:schemeClr val="accent1"/>
+          </a:effectRef>
+          <a:fontRef idx="minor">
+            <a:schemeClr val="lt1"/>
+          </a:fontRef>
+        </p:style>
+        <p:txBody>
+          <a:bodyPr rtlCol="0" anchor="ctr"/>
+          <a:lstStyle/>
+          <a:p>
+            <a:pPr algn="ctr"/>
+            <a:r>
+              <a:rPr lang="en-US" altLang="zh-TW" sz="2400" dirty="0">
+                <a:solidFill>
+                  <a:srgbClr val="FF0000"/>
+                </a:solidFill>
+              </a:rPr>
+              <a:t>The time of information</a:t>
+            </a:r>
+            <a:endParaRPr lang="zh-TW" altLang="en-US" sz="2400" dirty="0">
+              <a:solidFill>
+                <a:srgbClr val="FF0000"/>
+              </a:solidFill>
+            </a:endParaRPr>
+          </a:p>
+        </p:txBody>
+      </p:sp>
+      <p:sp>
+        <p:nvSpPr>
+          <p:cNvPr id="16" name="文字方塊 15">
+            <a:extLst>
+              <a:ext uri="{FF2B5EF4-FFF2-40B4-BE49-F238E27FC236}">
+                <a16:creationId xmlns:a16="http://schemas.microsoft.com/office/drawing/2014/main" id="{F6BE7F6D-3F17-46B3-8360-748A347BD3AD}"/>
+              </a:ext>
+            </a:extLst>
+          </p:cNvPr>
+          <p:cNvSpPr txBox="1"/>
+          <p:nvPr/>
+        </p:nvSpPr>
+        <p:spPr>
+          <a:xfrm>
+            <a:off x="838200" y="1518531"/>
+            <a:ext cx="2743290" cy="1200329"/>
+          </a:xfrm>
+          <a:prstGeom prst="rect">
+            <a:avLst/>
+          </a:prstGeom>
+          <a:solidFill>
+            <a:schemeClr val="bg1">
+              <a:lumMod val="75000"/>
+            </a:schemeClr>
+          </a:solidFill>
+          <a:ln w="38100">
+            <a:noFill/>
+            <a:prstDash val="dashDot"/>
+          </a:ln>
+        </p:spPr>
+        <p:txBody>
+          <a:bodyPr wrap="square" rtlCol="0">
+            <a:spAutoFit/>
+          </a:bodyPr>
+          <a:lstStyle/>
+          <a:p>
+            <a:r>
+              <a:rPr lang="en-US" altLang="zh-TW" sz="2400" dirty="0">
+                <a:solidFill>
+                  <a:schemeClr val="bg1"/>
+                </a:solidFill>
+              </a:rPr>
+              <a:t>Hidden information: </a:t>
+            </a:r>
+          </a:p>
+          <a:p>
+            <a:r>
+              <a:rPr lang="en-US" altLang="zh-TW" sz="2400" dirty="0">
+                <a:solidFill>
+                  <a:schemeClr val="bg1"/>
+                </a:solidFill>
+              </a:rPr>
+              <a:t>Today</a:t>
+            </a:r>
+          </a:p>
+          <a:p>
+            <a:r>
+              <a:rPr lang="en-US" altLang="zh-TW" sz="2400" dirty="0">
+                <a:solidFill>
+                  <a:schemeClr val="bg1"/>
+                </a:solidFill>
+              </a:rPr>
+              <a:t>Position</a:t>
+            </a:r>
+            <a:endParaRPr lang="zh-TW" altLang="en-US" sz="2400" dirty="0">
+              <a:solidFill>
+                <a:schemeClr val="bg1"/>
+              </a:solidFill>
+            </a:endParaRPr>
           </a:p>
         </p:txBody>
       </p:sp>

</xml_diff>